<commit_message>
changed instructions about probability of movement
</commit_message>
<xml_diff>
--- a/exp_img/instructions.pptx
+++ b/exp_img/instructions.pptx
@@ -291,7 +291,7 @@
           <a:p>
             <a:fld id="{9583AF26-4D68-42D5-A917-CD55DA578274}" type="datetimeFigureOut">
               <a:rPr lang="de-DE" smtClean="0"/>
-              <a:t>12.02.2025</a:t>
+              <a:t>17.03.2025</a:t>
             </a:fld>
             <a:endParaRPr lang="de-DE"/>
           </a:p>
@@ -489,7 +489,7 @@
           <a:p>
             <a:fld id="{9583AF26-4D68-42D5-A917-CD55DA578274}" type="datetimeFigureOut">
               <a:rPr lang="de-DE" smtClean="0"/>
-              <a:t>12.02.2025</a:t>
+              <a:t>17.03.2025</a:t>
             </a:fld>
             <a:endParaRPr lang="de-DE"/>
           </a:p>
@@ -697,7 +697,7 @@
           <a:p>
             <a:fld id="{9583AF26-4D68-42D5-A917-CD55DA578274}" type="datetimeFigureOut">
               <a:rPr lang="de-DE" smtClean="0"/>
-              <a:t>12.02.2025</a:t>
+              <a:t>17.03.2025</a:t>
             </a:fld>
             <a:endParaRPr lang="de-DE"/>
           </a:p>
@@ -895,7 +895,7 @@
           <a:p>
             <a:fld id="{9583AF26-4D68-42D5-A917-CD55DA578274}" type="datetimeFigureOut">
               <a:rPr lang="de-DE" smtClean="0"/>
-              <a:t>12.02.2025</a:t>
+              <a:t>17.03.2025</a:t>
             </a:fld>
             <a:endParaRPr lang="de-DE"/>
           </a:p>
@@ -1170,7 +1170,7 @@
           <a:p>
             <a:fld id="{9583AF26-4D68-42D5-A917-CD55DA578274}" type="datetimeFigureOut">
               <a:rPr lang="de-DE" smtClean="0"/>
-              <a:t>12.02.2025</a:t>
+              <a:t>17.03.2025</a:t>
             </a:fld>
             <a:endParaRPr lang="de-DE"/>
           </a:p>
@@ -1435,7 +1435,7 @@
           <a:p>
             <a:fld id="{9583AF26-4D68-42D5-A917-CD55DA578274}" type="datetimeFigureOut">
               <a:rPr lang="de-DE" smtClean="0"/>
-              <a:t>12.02.2025</a:t>
+              <a:t>17.03.2025</a:t>
             </a:fld>
             <a:endParaRPr lang="de-DE"/>
           </a:p>
@@ -1847,7 +1847,7 @@
           <a:p>
             <a:fld id="{9583AF26-4D68-42D5-A917-CD55DA578274}" type="datetimeFigureOut">
               <a:rPr lang="de-DE" smtClean="0"/>
-              <a:t>12.02.2025</a:t>
+              <a:t>17.03.2025</a:t>
             </a:fld>
             <a:endParaRPr lang="de-DE"/>
           </a:p>
@@ -1988,7 +1988,7 @@
           <a:p>
             <a:fld id="{9583AF26-4D68-42D5-A917-CD55DA578274}" type="datetimeFigureOut">
               <a:rPr lang="de-DE" smtClean="0"/>
-              <a:t>12.02.2025</a:t>
+              <a:t>17.03.2025</a:t>
             </a:fld>
             <a:endParaRPr lang="de-DE"/>
           </a:p>
@@ -2101,7 +2101,7 @@
           <a:p>
             <a:fld id="{9583AF26-4D68-42D5-A917-CD55DA578274}" type="datetimeFigureOut">
               <a:rPr lang="de-DE" smtClean="0"/>
-              <a:t>12.02.2025</a:t>
+              <a:t>17.03.2025</a:t>
             </a:fld>
             <a:endParaRPr lang="de-DE"/>
           </a:p>
@@ -2412,7 +2412,7 @@
           <a:p>
             <a:fld id="{9583AF26-4D68-42D5-A917-CD55DA578274}" type="datetimeFigureOut">
               <a:rPr lang="de-DE" smtClean="0"/>
-              <a:t>12.02.2025</a:t>
+              <a:t>17.03.2025</a:t>
             </a:fld>
             <a:endParaRPr lang="de-DE"/>
           </a:p>
@@ -2700,7 +2700,7 @@
           <a:p>
             <a:fld id="{9583AF26-4D68-42D5-A917-CD55DA578274}" type="datetimeFigureOut">
               <a:rPr lang="de-DE" smtClean="0"/>
-              <a:t>12.02.2025</a:t>
+              <a:t>17.03.2025</a:t>
             </a:fld>
             <a:endParaRPr lang="de-DE"/>
           </a:p>
@@ -2941,7 +2941,7 @@
           <a:p>
             <a:fld id="{9583AF26-4D68-42D5-A917-CD55DA578274}" type="datetimeFigureOut">
               <a:rPr lang="de-DE" smtClean="0"/>
-              <a:t>12.02.2025</a:t>
+              <a:t>17.03.2025</a:t>
             </a:fld>
             <a:endParaRPr lang="de-DE"/>
           </a:p>
@@ -3400,6 +3400,9 @@
                 <a:solidFill>
                   <a:schemeClr val="bg1"/>
                 </a:solidFill>
+                <a:latin typeface="Noto Sans" panose="020B0502040504020204" pitchFamily="34"/>
+                <a:ea typeface="Noto Sans" panose="020B0502040504020204" pitchFamily="34"/>
+                <a:cs typeface="Noto Sans" panose="020B0502040504020204" pitchFamily="34"/>
               </a:rPr>
               <a:t>Hallo  </a:t>
             </a:r>
@@ -3408,6 +3411,9 @@
                 <a:solidFill>
                   <a:schemeClr val="bg1"/>
                 </a:solidFill>
+                <a:latin typeface="Noto Sans" panose="020B0502040504020204" pitchFamily="34"/>
+                <a:ea typeface="Noto Sans" panose="020B0502040504020204" pitchFamily="34"/>
+                <a:cs typeface="Noto Sans" panose="020B0502040504020204" pitchFamily="34"/>
                 <a:sym typeface="Wingdings" panose="05000000000000000000" pitchFamily="2" charset="2"/>
               </a:rPr>
               <a:t> </a:t>
@@ -3437,6 +3443,9 @@
               <a:solidFill>
                 <a:schemeClr val="bg1"/>
               </a:solidFill>
+              <a:latin typeface="Noto Sans" panose="020B0502040504020204" pitchFamily="34"/>
+              <a:ea typeface="Noto Sans" panose="020B0502040504020204" pitchFamily="34"/>
+              <a:cs typeface="Noto Sans" panose="020B0502040504020204" pitchFamily="34"/>
               <a:sym typeface="Wingdings" panose="05000000000000000000" pitchFamily="2" charset="2"/>
             </a:endParaRPr>
           </a:p>
@@ -3447,6 +3456,9 @@
                 <a:solidFill>
                   <a:schemeClr val="bg1"/>
                 </a:solidFill>
+                <a:latin typeface="Noto Sans" panose="020B0502040504020204" pitchFamily="34"/>
+                <a:ea typeface="Noto Sans" panose="020B0502040504020204" pitchFamily="34"/>
+                <a:cs typeface="Noto Sans" panose="020B0502040504020204" pitchFamily="34"/>
                 <a:sym typeface="Wingdings" panose="05000000000000000000" pitchFamily="2" charset="2"/>
               </a:rPr>
               <a:t>Bitte die </a:t>
@@ -3456,6 +3468,9 @@
                 <a:solidFill>
                   <a:schemeClr val="bg1"/>
                 </a:solidFill>
+                <a:latin typeface="Noto Sans" panose="020B0502040504020204" pitchFamily="34"/>
+                <a:ea typeface="Noto Sans" panose="020B0502040504020204" pitchFamily="34"/>
+                <a:cs typeface="Noto Sans" panose="020B0502040504020204" pitchFamily="34"/>
                 <a:sym typeface="Wingdings" panose="05000000000000000000" pitchFamily="2" charset="2"/>
               </a:rPr>
               <a:t>LEERTASTE</a:t>
@@ -3465,6 +3480,9 @@
                 <a:solidFill>
                   <a:schemeClr val="bg1"/>
                 </a:solidFill>
+                <a:latin typeface="Noto Sans" panose="020B0502040504020204" pitchFamily="34"/>
+                <a:ea typeface="Noto Sans" panose="020B0502040504020204" pitchFamily="34"/>
+                <a:cs typeface="Noto Sans" panose="020B0502040504020204" pitchFamily="34"/>
                 <a:sym typeface="Wingdings" panose="05000000000000000000" pitchFamily="2" charset="2"/>
               </a:rPr>
               <a:t> drücken, um fortzufahren</a:t>
@@ -3473,6 +3491,9 @@
               <a:solidFill>
                 <a:schemeClr val="bg1"/>
               </a:solidFill>
+              <a:latin typeface="Noto Sans" panose="020B0502040504020204" pitchFamily="34"/>
+              <a:ea typeface="Noto Sans" panose="020B0502040504020204" pitchFamily="34"/>
+              <a:cs typeface="Noto Sans" panose="020B0502040504020204" pitchFamily="34"/>
             </a:endParaRPr>
           </a:p>
         </p:txBody>
@@ -3536,7 +3557,7 @@
         <p:spPr>
           <a:xfrm>
             <a:off x="1240672" y="461250"/>
-            <a:ext cx="9710656" cy="5847755"/>
+            <a:ext cx="9533720" cy="5539978"/>
           </a:xfrm>
           <a:prstGeom prst="rect">
             <a:avLst/>
@@ -3556,7 +3577,9 @@
                   <a:schemeClr val="bg1"/>
                 </a:solidFill>
                 <a:effectLst/>
-                <a:latin typeface="Consolas" panose="020B0609020204030204" pitchFamily="49" charset="0"/>
+                <a:latin typeface="Noto Sans" panose="020B0502040504020204" pitchFamily="34"/>
+                <a:ea typeface="Noto Sans" panose="020B0502040504020204" pitchFamily="34"/>
+                <a:cs typeface="Noto Sans" panose="020B0502040504020204" pitchFamily="34"/>
               </a:rPr>
               <a:t>Sie bewegen sich mit den Tasten </a:t>
             </a:r>
@@ -3566,7 +3589,9 @@
                   <a:schemeClr val="bg1"/>
                 </a:solidFill>
                 <a:effectLst/>
-                <a:latin typeface="Consolas" panose="020B0609020204030204" pitchFamily="49" charset="0"/>
+                <a:latin typeface="Noto Sans" panose="020B0502040504020204" pitchFamily="34"/>
+                <a:ea typeface="Noto Sans" panose="020B0502040504020204" pitchFamily="34"/>
+                <a:cs typeface="Noto Sans" panose="020B0502040504020204" pitchFamily="34"/>
               </a:rPr>
               <a:t>A</a:t>
             </a:r>
@@ -3576,7 +3601,9 @@
                   <a:schemeClr val="bg1"/>
                 </a:solidFill>
                 <a:effectLst/>
-                <a:latin typeface="Consolas" panose="020B0609020204030204" pitchFamily="49" charset="0"/>
+                <a:latin typeface="Noto Sans" panose="020B0502040504020204" pitchFamily="34"/>
+                <a:ea typeface="Noto Sans" panose="020B0502040504020204" pitchFamily="34"/>
+                <a:cs typeface="Noto Sans" panose="020B0502040504020204" pitchFamily="34"/>
               </a:rPr>
               <a:t> und </a:t>
             </a:r>
@@ -3586,7 +3613,9 @@
                   <a:schemeClr val="bg1"/>
                 </a:solidFill>
                 <a:effectLst/>
-                <a:latin typeface="Consolas" panose="020B0609020204030204" pitchFamily="49" charset="0"/>
+                <a:latin typeface="Noto Sans" panose="020B0502040504020204" pitchFamily="34"/>
+                <a:ea typeface="Noto Sans" panose="020B0502040504020204" pitchFamily="34"/>
+                <a:cs typeface="Noto Sans" panose="020B0502040504020204" pitchFamily="34"/>
               </a:rPr>
               <a:t>D </a:t>
             </a:r>
@@ -3596,7 +3625,9 @@
                   <a:schemeClr val="bg1"/>
                 </a:solidFill>
                 <a:effectLst/>
-                <a:latin typeface="Consolas" panose="020B0609020204030204" pitchFamily="49" charset="0"/>
+                <a:latin typeface="Noto Sans" panose="020B0502040504020204" pitchFamily="34"/>
+                <a:ea typeface="Noto Sans" panose="020B0502040504020204" pitchFamily="34"/>
+                <a:cs typeface="Noto Sans" panose="020B0502040504020204" pitchFamily="34"/>
               </a:rPr>
               <a:t>nach links und rechts</a:t>
             </a:r>
@@ -3606,7 +3637,9 @@
                   <a:schemeClr val="bg1"/>
                 </a:solidFill>
                 <a:effectLst/>
-                <a:latin typeface="Consolas" panose="020B0609020204030204" pitchFamily="49" charset="0"/>
+                <a:latin typeface="Noto Sans" panose="020B0502040504020204" pitchFamily="34"/>
+                <a:ea typeface="Noto Sans" panose="020B0502040504020204" pitchFamily="34"/>
+                <a:cs typeface="Noto Sans" panose="020B0502040504020204" pitchFamily="34"/>
               </a:rPr>
               <a:t>, Sie schießen mit der STRG-Taste. </a:t>
             </a:r>
@@ -3618,7 +3651,9 @@
                 <a:schemeClr val="bg1"/>
               </a:solidFill>
               <a:effectLst/>
-              <a:latin typeface="Consolas" panose="020B0609020204030204" pitchFamily="49" charset="0"/>
+              <a:latin typeface="Noto Sans" panose="020B0502040504020204" pitchFamily="34"/>
+              <a:ea typeface="Noto Sans" panose="020B0502040504020204" pitchFamily="34"/>
+              <a:cs typeface="Noto Sans" panose="020B0502040504020204" pitchFamily="34"/>
             </a:endParaRPr>
           </a:p>
           <a:p>
@@ -3629,7 +3664,9 @@
                   <a:schemeClr val="bg1"/>
                 </a:solidFill>
                 <a:effectLst/>
-                <a:latin typeface="Consolas" panose="020B0609020204030204" pitchFamily="49" charset="0"/>
+                <a:latin typeface="Noto Sans" panose="020B0502040504020204" pitchFamily="34"/>
+                <a:ea typeface="Noto Sans" panose="020B0502040504020204" pitchFamily="34"/>
+                <a:cs typeface="Noto Sans" panose="020B0502040504020204" pitchFamily="34"/>
               </a:rPr>
               <a:t>Legen Sie nun bitte </a:t>
             </a:r>
@@ -3639,7 +3676,9 @@
                   <a:srgbClr val="FFFF00"/>
                 </a:solidFill>
                 <a:effectLst/>
-                <a:latin typeface="Consolas" panose="020B0609020204030204" pitchFamily="49" charset="0"/>
+                <a:latin typeface="Noto Sans" panose="020B0502040504020204" pitchFamily="34"/>
+                <a:ea typeface="Noto Sans" panose="020B0502040504020204" pitchFamily="34"/>
+                <a:cs typeface="Noto Sans" panose="020B0502040504020204" pitchFamily="34"/>
               </a:rPr>
               <a:t>Zeige</a:t>
             </a:r>
@@ -3649,7 +3688,9 @@
                   <a:schemeClr val="bg1"/>
                 </a:solidFill>
                 <a:effectLst/>
-                <a:latin typeface="Consolas" panose="020B0609020204030204" pitchFamily="49" charset="0"/>
+                <a:latin typeface="Noto Sans" panose="020B0502040504020204" pitchFamily="34"/>
+                <a:ea typeface="Noto Sans" panose="020B0502040504020204" pitchFamily="34"/>
+                <a:cs typeface="Noto Sans" panose="020B0502040504020204" pitchFamily="34"/>
               </a:rPr>
               <a:t>- und </a:t>
             </a:r>
@@ -3659,7 +3700,9 @@
                   <a:srgbClr val="FF0000"/>
                 </a:solidFill>
                 <a:effectLst/>
-                <a:latin typeface="Consolas" panose="020B0609020204030204" pitchFamily="49" charset="0"/>
+                <a:latin typeface="Noto Sans" panose="020B0502040504020204" pitchFamily="34"/>
+                <a:ea typeface="Noto Sans" panose="020B0502040504020204" pitchFamily="34"/>
+                <a:cs typeface="Noto Sans" panose="020B0502040504020204" pitchFamily="34"/>
               </a:rPr>
               <a:t>Ring</a:t>
             </a:r>
@@ -3669,7 +3712,9 @@
                   <a:schemeClr val="bg1"/>
                 </a:solidFill>
                 <a:effectLst/>
-                <a:latin typeface="Consolas" panose="020B0609020204030204" pitchFamily="49" charset="0"/>
+                <a:latin typeface="Noto Sans" panose="020B0502040504020204" pitchFamily="34"/>
+                <a:ea typeface="Noto Sans" panose="020B0502040504020204" pitchFamily="34"/>
+                <a:cs typeface="Noto Sans" panose="020B0502040504020204" pitchFamily="34"/>
               </a:rPr>
               <a:t>finger der </a:t>
             </a:r>
@@ -3679,7 +3724,9 @@
                   <a:schemeClr val="bg1"/>
                 </a:solidFill>
                 <a:effectLst/>
-                <a:latin typeface="Consolas" panose="020B0609020204030204" pitchFamily="49" charset="0"/>
+                <a:latin typeface="Noto Sans" panose="020B0502040504020204" pitchFamily="34"/>
+                <a:ea typeface="Noto Sans" panose="020B0502040504020204" pitchFamily="34"/>
+                <a:cs typeface="Noto Sans" panose="020B0502040504020204" pitchFamily="34"/>
               </a:rPr>
               <a:t>linken</a:t>
             </a:r>
@@ -3689,7 +3736,9 @@
                   <a:schemeClr val="bg1"/>
                 </a:solidFill>
                 <a:effectLst/>
-                <a:latin typeface="Consolas" panose="020B0609020204030204" pitchFamily="49" charset="0"/>
+                <a:latin typeface="Noto Sans" panose="020B0502040504020204" pitchFamily="34"/>
+                <a:ea typeface="Noto Sans" panose="020B0502040504020204" pitchFamily="34"/>
+                <a:cs typeface="Noto Sans" panose="020B0502040504020204" pitchFamily="34"/>
               </a:rPr>
               <a:t> Hand auf die Tasten </a:t>
             </a:r>
@@ -3699,7 +3748,9 @@
                   <a:srgbClr val="FF0000"/>
                 </a:solidFill>
                 <a:effectLst/>
-                <a:latin typeface="Consolas" panose="020B0609020204030204" pitchFamily="49" charset="0"/>
+                <a:latin typeface="Noto Sans" panose="020B0502040504020204" pitchFamily="34"/>
+                <a:ea typeface="Noto Sans" panose="020B0502040504020204" pitchFamily="34"/>
+                <a:cs typeface="Noto Sans" panose="020B0502040504020204" pitchFamily="34"/>
               </a:rPr>
               <a:t>A</a:t>
             </a:r>
@@ -3709,7 +3760,9 @@
                   <a:schemeClr val="bg1"/>
                 </a:solidFill>
                 <a:effectLst/>
-                <a:latin typeface="Consolas" panose="020B0609020204030204" pitchFamily="49" charset="0"/>
+                <a:latin typeface="Noto Sans" panose="020B0502040504020204" pitchFamily="34"/>
+                <a:ea typeface="Noto Sans" panose="020B0502040504020204" pitchFamily="34"/>
+                <a:cs typeface="Noto Sans" panose="020B0502040504020204" pitchFamily="34"/>
               </a:rPr>
               <a:t> und </a:t>
             </a:r>
@@ -3719,7 +3772,9 @@
                   <a:srgbClr val="FFFF00"/>
                 </a:solidFill>
                 <a:effectLst/>
-                <a:latin typeface="Consolas" panose="020B0609020204030204" pitchFamily="49" charset="0"/>
+                <a:latin typeface="Noto Sans" panose="020B0502040504020204" pitchFamily="34"/>
+                <a:ea typeface="Noto Sans" panose="020B0502040504020204" pitchFamily="34"/>
+                <a:cs typeface="Noto Sans" panose="020B0502040504020204" pitchFamily="34"/>
               </a:rPr>
               <a:t>D</a:t>
             </a:r>
@@ -3729,7 +3784,9 @@
                   <a:schemeClr val="bg1"/>
                 </a:solidFill>
                 <a:effectLst/>
-                <a:latin typeface="Consolas" panose="020B0609020204030204" pitchFamily="49" charset="0"/>
+                <a:latin typeface="Noto Sans" panose="020B0502040504020204" pitchFamily="34"/>
+                <a:ea typeface="Noto Sans" panose="020B0502040504020204" pitchFamily="34"/>
+                <a:cs typeface="Noto Sans" panose="020B0502040504020204" pitchFamily="34"/>
               </a:rPr>
               <a:t>, den </a:t>
             </a:r>
@@ -3739,7 +3796,9 @@
                   <a:srgbClr val="00B0F0"/>
                 </a:solidFill>
                 <a:effectLst/>
-                <a:latin typeface="Consolas" panose="020B0609020204030204" pitchFamily="49" charset="0"/>
+                <a:latin typeface="Noto Sans" panose="020B0502040504020204" pitchFamily="34"/>
+                <a:ea typeface="Noto Sans" panose="020B0502040504020204" pitchFamily="34"/>
+                <a:cs typeface="Noto Sans" panose="020B0502040504020204" pitchFamily="34"/>
               </a:rPr>
               <a:t>Daumen</a:t>
             </a:r>
@@ -3749,7 +3808,9 @@
                   <a:schemeClr val="bg1"/>
                 </a:solidFill>
                 <a:effectLst/>
-                <a:latin typeface="Consolas" panose="020B0609020204030204" pitchFamily="49" charset="0"/>
+                <a:latin typeface="Noto Sans" panose="020B0502040504020204" pitchFamily="34"/>
+                <a:ea typeface="Noto Sans" panose="020B0502040504020204" pitchFamily="34"/>
+                <a:cs typeface="Noto Sans" panose="020B0502040504020204" pitchFamily="34"/>
               </a:rPr>
               <a:t> der </a:t>
             </a:r>
@@ -3759,7 +3820,9 @@
                   <a:schemeClr val="bg1"/>
                 </a:solidFill>
                 <a:effectLst/>
-                <a:latin typeface="Consolas" panose="020B0609020204030204" pitchFamily="49" charset="0"/>
+                <a:latin typeface="Noto Sans" panose="020B0502040504020204" pitchFamily="34"/>
+                <a:ea typeface="Noto Sans" panose="020B0502040504020204" pitchFamily="34"/>
+                <a:cs typeface="Noto Sans" panose="020B0502040504020204" pitchFamily="34"/>
               </a:rPr>
               <a:t>linken</a:t>
             </a:r>
@@ -3769,7 +3832,9 @@
                   <a:schemeClr val="bg1"/>
                 </a:solidFill>
                 <a:effectLst/>
-                <a:latin typeface="Consolas" panose="020B0609020204030204" pitchFamily="49" charset="0"/>
+                <a:latin typeface="Noto Sans" panose="020B0502040504020204" pitchFamily="34"/>
+                <a:ea typeface="Noto Sans" panose="020B0502040504020204" pitchFamily="34"/>
+                <a:cs typeface="Noto Sans" panose="020B0502040504020204" pitchFamily="34"/>
               </a:rPr>
               <a:t> Hand auf die </a:t>
             </a:r>
@@ -3779,7 +3844,9 @@
                   <a:srgbClr val="00B0F0"/>
                 </a:solidFill>
                 <a:effectLst/>
-                <a:latin typeface="Consolas" panose="020B0609020204030204" pitchFamily="49" charset="0"/>
+                <a:latin typeface="Noto Sans" panose="020B0502040504020204" pitchFamily="34"/>
+                <a:ea typeface="Noto Sans" panose="020B0502040504020204" pitchFamily="34"/>
+                <a:cs typeface="Noto Sans" panose="020B0502040504020204" pitchFamily="34"/>
               </a:rPr>
               <a:t>Leertaste</a:t>
             </a:r>
@@ -3789,7 +3856,9 @@
                   <a:schemeClr val="bg1"/>
                 </a:solidFill>
                 <a:effectLst/>
-                <a:latin typeface="Consolas" panose="020B0609020204030204" pitchFamily="49" charset="0"/>
+                <a:latin typeface="Noto Sans" panose="020B0502040504020204" pitchFamily="34"/>
+                <a:ea typeface="Noto Sans" panose="020B0502040504020204" pitchFamily="34"/>
+                <a:cs typeface="Noto Sans" panose="020B0502040504020204" pitchFamily="34"/>
               </a:rPr>
               <a:t> und einen oder zwei </a:t>
             </a:r>
@@ -3799,7 +3868,9 @@
                   <a:srgbClr val="CC0066"/>
                 </a:solidFill>
                 <a:effectLst/>
-                <a:latin typeface="Consolas" panose="020B0609020204030204" pitchFamily="49" charset="0"/>
+                <a:latin typeface="Noto Sans" panose="020B0502040504020204" pitchFamily="34"/>
+                <a:ea typeface="Noto Sans" panose="020B0502040504020204" pitchFamily="34"/>
+                <a:cs typeface="Noto Sans" panose="020B0502040504020204" pitchFamily="34"/>
               </a:rPr>
               <a:t>Finger</a:t>
             </a:r>
@@ -3809,7 +3880,9 @@
                   <a:schemeClr val="bg1"/>
                 </a:solidFill>
                 <a:effectLst/>
-                <a:latin typeface="Consolas" panose="020B0609020204030204" pitchFamily="49" charset="0"/>
+                <a:latin typeface="Noto Sans" panose="020B0502040504020204" pitchFamily="34"/>
+                <a:ea typeface="Noto Sans" panose="020B0502040504020204" pitchFamily="34"/>
+                <a:cs typeface="Noto Sans" panose="020B0502040504020204" pitchFamily="34"/>
               </a:rPr>
               <a:t> der </a:t>
             </a:r>
@@ -3819,7 +3892,9 @@
                   <a:srgbClr val="CC0066"/>
                 </a:solidFill>
                 <a:effectLst/>
-                <a:latin typeface="Consolas" panose="020B0609020204030204" pitchFamily="49" charset="0"/>
+                <a:latin typeface="Noto Sans" panose="020B0502040504020204" pitchFamily="34"/>
+                <a:ea typeface="Noto Sans" panose="020B0502040504020204" pitchFamily="34"/>
+                <a:cs typeface="Noto Sans" panose="020B0502040504020204" pitchFamily="34"/>
               </a:rPr>
               <a:t>rechten</a:t>
             </a:r>
@@ -3829,7 +3904,9 @@
                   <a:schemeClr val="bg1"/>
                 </a:solidFill>
                 <a:effectLst/>
-                <a:latin typeface="Consolas" panose="020B0609020204030204" pitchFamily="49" charset="0"/>
+                <a:latin typeface="Noto Sans" panose="020B0502040504020204" pitchFamily="34"/>
+                <a:ea typeface="Noto Sans" panose="020B0502040504020204" pitchFamily="34"/>
+                <a:cs typeface="Noto Sans" panose="020B0502040504020204" pitchFamily="34"/>
               </a:rPr>
               <a:t> Hand auf die </a:t>
             </a:r>
@@ -3839,7 +3916,9 @@
                   <a:srgbClr val="CC0066"/>
                 </a:solidFill>
                 <a:effectLst/>
-                <a:latin typeface="Consolas" panose="020B0609020204030204" pitchFamily="49" charset="0"/>
+                <a:latin typeface="Noto Sans" panose="020B0502040504020204" pitchFamily="34"/>
+                <a:ea typeface="Noto Sans" panose="020B0502040504020204" pitchFamily="34"/>
+                <a:cs typeface="Noto Sans" panose="020B0502040504020204" pitchFamily="34"/>
               </a:rPr>
               <a:t>STRG</a:t>
             </a:r>
@@ -3849,7 +3928,9 @@
                   <a:schemeClr val="bg1"/>
                 </a:solidFill>
                 <a:effectLst/>
-                <a:latin typeface="Consolas" panose="020B0609020204030204" pitchFamily="49" charset="0"/>
+                <a:latin typeface="Noto Sans" panose="020B0502040504020204" pitchFamily="34"/>
+                <a:ea typeface="Noto Sans" panose="020B0502040504020204" pitchFamily="34"/>
+                <a:cs typeface="Noto Sans" panose="020B0502040504020204" pitchFamily="34"/>
               </a:rPr>
               <a:t>-Taste rechts unten auf der Tastatur.</a:t>
             </a:r>
@@ -3960,6 +4041,9 @@
                 <a:solidFill>
                   <a:schemeClr val="bg1"/>
                 </a:solidFill>
+                <a:latin typeface="Noto Sans" panose="020B0502040504020204" pitchFamily="34"/>
+                <a:ea typeface="Noto Sans" panose="020B0502040504020204" pitchFamily="34"/>
+                <a:cs typeface="Noto Sans" panose="020B0502040504020204" pitchFamily="34"/>
                 <a:sym typeface="Wingdings" panose="05000000000000000000" pitchFamily="2" charset="2"/>
               </a:rPr>
               <a:t>Bitte die </a:t>
@@ -3969,6 +4053,9 @@
                 <a:solidFill>
                   <a:schemeClr val="bg1"/>
                 </a:solidFill>
+                <a:latin typeface="Noto Sans" panose="020B0502040504020204" pitchFamily="34"/>
+                <a:ea typeface="Noto Sans" panose="020B0502040504020204" pitchFamily="34"/>
+                <a:cs typeface="Noto Sans" panose="020B0502040504020204" pitchFamily="34"/>
                 <a:sym typeface="Wingdings" panose="05000000000000000000" pitchFamily="2" charset="2"/>
               </a:rPr>
               <a:t>LEERTASTE</a:t>
@@ -3978,6 +4065,9 @@
                 <a:solidFill>
                   <a:schemeClr val="bg1"/>
                 </a:solidFill>
+                <a:latin typeface="Noto Sans" panose="020B0502040504020204" pitchFamily="34"/>
+                <a:ea typeface="Noto Sans" panose="020B0502040504020204" pitchFamily="34"/>
+                <a:cs typeface="Noto Sans" panose="020B0502040504020204" pitchFamily="34"/>
                 <a:sym typeface="Wingdings" panose="05000000000000000000" pitchFamily="2" charset="2"/>
               </a:rPr>
               <a:t> drücken, um fortzufahren</a:t>
@@ -3986,6 +4076,9 @@
               <a:solidFill>
                 <a:schemeClr val="bg1"/>
               </a:solidFill>
+              <a:latin typeface="Noto Sans" panose="020B0502040504020204" pitchFamily="34"/>
+              <a:ea typeface="Noto Sans" panose="020B0502040504020204" pitchFamily="34"/>
+              <a:cs typeface="Noto Sans" panose="020B0502040504020204" pitchFamily="34"/>
             </a:endParaRPr>
           </a:p>
         </p:txBody>
@@ -4331,7 +4424,9 @@
                 <a:solidFill>
                   <a:schemeClr val="bg1"/>
                 </a:solidFill>
-                <a:latin typeface="Consolas" panose="020B0609020204030204" pitchFamily="49" charset="0"/>
+                <a:latin typeface="Noto Sans" panose="020B0502040504020204" pitchFamily="34"/>
+                <a:ea typeface="Noto Sans" panose="020B0502040504020204" pitchFamily="34"/>
+                <a:cs typeface="Noto Sans" panose="020B0502040504020204" pitchFamily="34"/>
                 <a:sym typeface="Wingdings" panose="05000000000000000000" pitchFamily="2" charset="2"/>
               </a:rPr>
               <a:t>Jeder Spieldurchlauf besteht aus Start, Erscheinen des Ziels, Bewegung zum und schießen auf das Ziel und der Punkteanzeige:</a:t>
@@ -4363,6 +4458,9 @@
               <a:solidFill>
                 <a:schemeClr val="bg1"/>
               </a:solidFill>
+              <a:latin typeface="Noto Sans" panose="020B0502040504020204" pitchFamily="34"/>
+              <a:ea typeface="Noto Sans" panose="020B0502040504020204" pitchFamily="34"/>
+              <a:cs typeface="Noto Sans" panose="020B0502040504020204" pitchFamily="34"/>
               <a:sym typeface="Wingdings" panose="05000000000000000000" pitchFamily="2" charset="2"/>
             </a:endParaRPr>
           </a:p>
@@ -4373,6 +4471,9 @@
                 <a:solidFill>
                   <a:schemeClr val="bg1"/>
                 </a:solidFill>
+                <a:latin typeface="Noto Sans" panose="020B0502040504020204" pitchFamily="34"/>
+                <a:ea typeface="Noto Sans" panose="020B0502040504020204" pitchFamily="34"/>
+                <a:cs typeface="Noto Sans" panose="020B0502040504020204" pitchFamily="34"/>
                 <a:sym typeface="Wingdings" panose="05000000000000000000" pitchFamily="2" charset="2"/>
               </a:rPr>
               <a:t>Bitte die </a:t>
@@ -4382,6 +4483,9 @@
                 <a:solidFill>
                   <a:schemeClr val="bg1"/>
                 </a:solidFill>
+                <a:latin typeface="Noto Sans" panose="020B0502040504020204" pitchFamily="34"/>
+                <a:ea typeface="Noto Sans" panose="020B0502040504020204" pitchFamily="34"/>
+                <a:cs typeface="Noto Sans" panose="020B0502040504020204" pitchFamily="34"/>
                 <a:sym typeface="Wingdings" panose="05000000000000000000" pitchFamily="2" charset="2"/>
               </a:rPr>
               <a:t>LEERTASTE</a:t>
@@ -4391,6 +4495,9 @@
                 <a:solidFill>
                   <a:schemeClr val="bg1"/>
                 </a:solidFill>
+                <a:latin typeface="Noto Sans" panose="020B0502040504020204" pitchFamily="34"/>
+                <a:ea typeface="Noto Sans" panose="020B0502040504020204" pitchFamily="34"/>
+                <a:cs typeface="Noto Sans" panose="020B0502040504020204" pitchFamily="34"/>
                 <a:sym typeface="Wingdings" panose="05000000000000000000" pitchFamily="2" charset="2"/>
               </a:rPr>
               <a:t> drücken, um fortzufahren</a:t>
@@ -4399,6 +4506,9 @@
               <a:solidFill>
                 <a:schemeClr val="bg1"/>
               </a:solidFill>
+              <a:latin typeface="Noto Sans" panose="020B0502040504020204" pitchFamily="34"/>
+              <a:ea typeface="Noto Sans" panose="020B0502040504020204" pitchFamily="34"/>
+              <a:cs typeface="Noto Sans" panose="020B0502040504020204" pitchFamily="34"/>
             </a:endParaRPr>
           </a:p>
         </p:txBody>
@@ -4461,8 +4571,8 @@
         </p:nvSpPr>
         <p:spPr>
           <a:xfrm>
-            <a:off x="1638394" y="647110"/>
-            <a:ext cx="8143960" cy="5601533"/>
+            <a:off x="931027" y="1069804"/>
+            <a:ext cx="9032481" cy="5109091"/>
           </a:xfrm>
           <a:prstGeom prst="rect">
             <a:avLst/>
@@ -4481,7 +4591,9 @@
                 <a:solidFill>
                   <a:schemeClr val="bg1"/>
                 </a:solidFill>
-                <a:latin typeface="Consolas" panose="020B0609020204030204" pitchFamily="49" charset="0"/>
+                <a:latin typeface="Noto Sans" panose="020B0502040504020204" pitchFamily="34"/>
+                <a:ea typeface="Noto Sans" panose="020B0502040504020204" pitchFamily="34"/>
+                <a:cs typeface="Noto Sans" panose="020B0502040504020204" pitchFamily="34"/>
                 <a:sym typeface="Wingdings" panose="05000000000000000000" pitchFamily="2" charset="2"/>
               </a:rPr>
               <a:t>Zum Start sehen Sie die Hand Ihrer Spielfigur, die eine Pistole hält, nach 1 Sekunde erscheint dann links oder rechts eine Zielscheibe</a:t>
@@ -4563,6 +4675,9 @@
                 <a:solidFill>
                   <a:schemeClr val="bg1"/>
                 </a:solidFill>
+                <a:latin typeface="Noto Sans" panose="020B0502040504020204" pitchFamily="34"/>
+                <a:ea typeface="Noto Sans" panose="020B0502040504020204" pitchFamily="34"/>
+                <a:cs typeface="Noto Sans" panose="020B0502040504020204" pitchFamily="34"/>
                 <a:sym typeface="Wingdings" panose="05000000000000000000" pitchFamily="2" charset="2"/>
               </a:rPr>
               <a:t>Bitte die </a:t>
@@ -4572,6 +4687,9 @@
                 <a:solidFill>
                   <a:schemeClr val="bg1"/>
                 </a:solidFill>
+                <a:latin typeface="Noto Sans" panose="020B0502040504020204" pitchFamily="34"/>
+                <a:ea typeface="Noto Sans" panose="020B0502040504020204" pitchFamily="34"/>
+                <a:cs typeface="Noto Sans" panose="020B0502040504020204" pitchFamily="34"/>
                 <a:sym typeface="Wingdings" panose="05000000000000000000" pitchFamily="2" charset="2"/>
               </a:rPr>
               <a:t>LEERTASTE</a:t>
@@ -4581,6 +4699,9 @@
                 <a:solidFill>
                   <a:schemeClr val="bg1"/>
                 </a:solidFill>
+                <a:latin typeface="Noto Sans" panose="020B0502040504020204" pitchFamily="34"/>
+                <a:ea typeface="Noto Sans" panose="020B0502040504020204" pitchFamily="34"/>
+                <a:cs typeface="Noto Sans" panose="020B0502040504020204" pitchFamily="34"/>
                 <a:sym typeface="Wingdings" panose="05000000000000000000" pitchFamily="2" charset="2"/>
               </a:rPr>
               <a:t> drücken, um fortzufahren</a:t>
@@ -4589,6 +4710,9 @@
               <a:solidFill>
                 <a:schemeClr val="bg1"/>
               </a:solidFill>
+              <a:latin typeface="Noto Sans" panose="020B0502040504020204" pitchFamily="34"/>
+              <a:ea typeface="Noto Sans" panose="020B0502040504020204" pitchFamily="34"/>
+              <a:cs typeface="Noto Sans" panose="020B0502040504020204" pitchFamily="34"/>
             </a:endParaRPr>
           </a:p>
         </p:txBody>
@@ -4743,7 +4867,9 @@
                 <a:solidFill>
                   <a:schemeClr val="bg1"/>
                 </a:solidFill>
-                <a:latin typeface="Consolas" panose="020B0609020204030204" pitchFamily="49" charset="0"/>
+                <a:latin typeface="Noto Sans" panose="020B0502040504020204" pitchFamily="34"/>
+                <a:ea typeface="Noto Sans" panose="020B0502040504020204" pitchFamily="34"/>
+                <a:cs typeface="Noto Sans" panose="020B0502040504020204" pitchFamily="34"/>
               </a:rPr>
               <a:t>1 Sekunde</a:t>
             </a:r>
@@ -4809,7 +4935,7 @@
         <p:spPr>
           <a:xfrm>
             <a:off x="1574008" y="327932"/>
-            <a:ext cx="8143960" cy="6155531"/>
+            <a:ext cx="8143960" cy="5724644"/>
           </a:xfrm>
           <a:prstGeom prst="rect">
             <a:avLst/>
@@ -4828,7 +4954,9 @@
                 <a:solidFill>
                   <a:schemeClr val="bg1"/>
                 </a:solidFill>
-                <a:latin typeface="Consolas" panose="020B0609020204030204" pitchFamily="49" charset="0"/>
+                <a:latin typeface="Noto Sans" panose="020B0502040504020204" pitchFamily="34"/>
+                <a:ea typeface="Noto Sans" panose="020B0502040504020204" pitchFamily="34"/>
+                <a:cs typeface="Noto Sans" panose="020B0502040504020204" pitchFamily="34"/>
                 <a:sym typeface="Wingdings" panose="05000000000000000000" pitchFamily="2" charset="2"/>
               </a:rPr>
               <a:t>Nun steuern Sie mit den Tasten A und D Ihre Spielfigur seitlich auf Höhe des Ziels und schießen mit STRG darauf. </a:t>
@@ -4841,7 +4969,9 @@
                 <a:solidFill>
                   <a:schemeClr val="bg1"/>
                 </a:solidFill>
-                <a:latin typeface="Consolas" panose="020B0609020204030204" pitchFamily="49" charset="0"/>
+                <a:latin typeface="Noto Sans" panose="020B0502040504020204" pitchFamily="34"/>
+                <a:ea typeface="Noto Sans" panose="020B0502040504020204" pitchFamily="34"/>
+                <a:cs typeface="Noto Sans" panose="020B0502040504020204" pitchFamily="34"/>
                 <a:sym typeface="Wingdings" panose="05000000000000000000" pitchFamily="2" charset="2"/>
               </a:rPr>
               <a:t>Achtung</a:t>
@@ -4851,7 +4981,9 @@
                 <a:solidFill>
                   <a:schemeClr val="bg1"/>
                 </a:solidFill>
-                <a:latin typeface="Consolas" panose="020B0609020204030204" pitchFamily="49" charset="0"/>
+                <a:latin typeface="Noto Sans" panose="020B0502040504020204" pitchFamily="34"/>
+                <a:ea typeface="Noto Sans" panose="020B0502040504020204" pitchFamily="34"/>
+                <a:cs typeface="Noto Sans" panose="020B0502040504020204" pitchFamily="34"/>
                 <a:sym typeface="Wingdings" panose="05000000000000000000" pitchFamily="2" charset="2"/>
               </a:rPr>
               <a:t>: Sie haben nach Erscheinen des Ziels nur </a:t>
@@ -4861,17 +4993,21 @@
                 <a:solidFill>
                   <a:srgbClr val="FFFF00"/>
                 </a:solidFill>
-                <a:latin typeface="Consolas" panose="020B0609020204030204" pitchFamily="49" charset="0"/>
+                <a:latin typeface="Noto Sans" panose="020B0502040504020204" pitchFamily="34"/>
+                <a:ea typeface="Noto Sans" panose="020B0502040504020204" pitchFamily="34"/>
+                <a:cs typeface="Noto Sans" panose="020B0502040504020204" pitchFamily="34"/>
                 <a:sym typeface="Wingdings" panose="05000000000000000000" pitchFamily="2" charset="2"/>
               </a:rPr>
-              <a:t>3 Sekunden </a:t>
+              <a:t>5 Sekunden </a:t>
             </a:r>
             <a:r>
               <a:rPr lang="de-DE" sz="2800" dirty="0">
                 <a:solidFill>
                   <a:schemeClr val="bg1"/>
                 </a:solidFill>
-                <a:latin typeface="Consolas" panose="020B0609020204030204" pitchFamily="49" charset="0"/>
+                <a:latin typeface="Noto Sans" panose="020B0502040504020204" pitchFamily="34"/>
+                <a:ea typeface="Noto Sans" panose="020B0502040504020204" pitchFamily="34"/>
+                <a:cs typeface="Noto Sans" panose="020B0502040504020204" pitchFamily="34"/>
                 <a:sym typeface="Wingdings" panose="05000000000000000000" pitchFamily="2" charset="2"/>
               </a:rPr>
               <a:t>und nur </a:t>
@@ -4881,7 +5017,9 @@
                 <a:solidFill>
                   <a:srgbClr val="FFFF00"/>
                 </a:solidFill>
-                <a:latin typeface="Consolas" panose="020B0609020204030204" pitchFamily="49" charset="0"/>
+                <a:latin typeface="Noto Sans" panose="020B0502040504020204" pitchFamily="34"/>
+                <a:ea typeface="Noto Sans" panose="020B0502040504020204" pitchFamily="34"/>
+                <a:cs typeface="Noto Sans" panose="020B0502040504020204" pitchFamily="34"/>
                 <a:sym typeface="Wingdings" panose="05000000000000000000" pitchFamily="2" charset="2"/>
               </a:rPr>
               <a:t>einen Schuss!</a:t>
@@ -4953,6 +5091,9 @@
               <a:solidFill>
                 <a:schemeClr val="bg1"/>
               </a:solidFill>
+              <a:latin typeface="Noto Sans" panose="020B0502040504020204" pitchFamily="34"/>
+              <a:ea typeface="Noto Sans" panose="020B0502040504020204" pitchFamily="34"/>
+              <a:cs typeface="Noto Sans" panose="020B0502040504020204" pitchFamily="34"/>
               <a:sym typeface="Wingdings" panose="05000000000000000000" pitchFamily="2" charset="2"/>
             </a:endParaRPr>
           </a:p>
@@ -4963,6 +5104,9 @@
                 <a:solidFill>
                   <a:schemeClr val="bg1"/>
                 </a:solidFill>
+                <a:latin typeface="Noto Sans" panose="020B0502040504020204" pitchFamily="34"/>
+                <a:ea typeface="Noto Sans" panose="020B0502040504020204" pitchFamily="34"/>
+                <a:cs typeface="Noto Sans" panose="020B0502040504020204" pitchFamily="34"/>
                 <a:sym typeface="Wingdings" panose="05000000000000000000" pitchFamily="2" charset="2"/>
               </a:rPr>
               <a:t>Bitte die </a:t>
@@ -4972,6 +5116,9 @@
                 <a:solidFill>
                   <a:schemeClr val="bg1"/>
                 </a:solidFill>
+                <a:latin typeface="Noto Sans" panose="020B0502040504020204" pitchFamily="34"/>
+                <a:ea typeface="Noto Sans" panose="020B0502040504020204" pitchFamily="34"/>
+                <a:cs typeface="Noto Sans" panose="020B0502040504020204" pitchFamily="34"/>
                 <a:sym typeface="Wingdings" panose="05000000000000000000" pitchFamily="2" charset="2"/>
               </a:rPr>
               <a:t>LEERTASTE</a:t>
@@ -4981,6 +5128,9 @@
                 <a:solidFill>
                   <a:schemeClr val="bg1"/>
                 </a:solidFill>
+                <a:latin typeface="Noto Sans" panose="020B0502040504020204" pitchFamily="34"/>
+                <a:ea typeface="Noto Sans" panose="020B0502040504020204" pitchFamily="34"/>
+                <a:cs typeface="Noto Sans" panose="020B0502040504020204" pitchFamily="34"/>
                 <a:sym typeface="Wingdings" panose="05000000000000000000" pitchFamily="2" charset="2"/>
               </a:rPr>
               <a:t> drücken, um fortzufahren</a:t>
@@ -4989,6 +5139,9 @@
               <a:solidFill>
                 <a:schemeClr val="bg1"/>
               </a:solidFill>
+              <a:latin typeface="Noto Sans" panose="020B0502040504020204" pitchFamily="34"/>
+              <a:ea typeface="Noto Sans" panose="020B0502040504020204" pitchFamily="34"/>
+              <a:cs typeface="Noto Sans" panose="020B0502040504020204" pitchFamily="34"/>
             </a:endParaRPr>
           </a:p>
         </p:txBody>
@@ -5021,7 +5174,7 @@
         </p:blipFill>
         <p:spPr>
           <a:xfrm>
-            <a:off x="3061952" y="3089647"/>
+            <a:off x="3087832" y="2796349"/>
             <a:ext cx="4706058" cy="2646084"/>
           </a:xfrm>
           <a:prstGeom prst="rect">
@@ -5868,7 +6021,9 @@
                 <a:schemeClr val="bg1"/>
               </a:solidFill>
               <a:effectLst/>
-              <a:latin typeface="Consolas" panose="020B0609020204030204" pitchFamily="49" charset="0"/>
+              <a:latin typeface="Noto Sans" panose="020B0502040504020204" pitchFamily="34"/>
+              <a:ea typeface="Noto Sans" panose="020B0502040504020204" pitchFamily="34"/>
+              <a:cs typeface="Noto Sans" panose="020B0502040504020204" pitchFamily="34"/>
             </a:endParaRPr>
           </a:p>
           <a:p>
@@ -5877,7 +6032,9 @@
               <a:solidFill>
                 <a:schemeClr val="bg1"/>
               </a:solidFill>
-              <a:latin typeface="Consolas" panose="020B0609020204030204" pitchFamily="49" charset="0"/>
+              <a:latin typeface="Noto Sans" panose="020B0502040504020204" pitchFamily="34"/>
+              <a:ea typeface="Noto Sans" panose="020B0502040504020204" pitchFamily="34"/>
+              <a:cs typeface="Noto Sans" panose="020B0502040504020204" pitchFamily="34"/>
             </a:endParaRPr>
           </a:p>
           <a:p>
@@ -5888,7 +6045,9 @@
                   <a:schemeClr val="bg1"/>
                 </a:solidFill>
                 <a:effectLst/>
-                <a:latin typeface="Consolas" panose="020B0609020204030204" pitchFamily="49" charset="0"/>
+                <a:latin typeface="Noto Sans" panose="020B0502040504020204" pitchFamily="34"/>
+                <a:ea typeface="Noto Sans" panose="020B0502040504020204" pitchFamily="34"/>
+                <a:cs typeface="Noto Sans" panose="020B0502040504020204" pitchFamily="34"/>
               </a:rPr>
               <a:t>Es gibt in diesem Spiel eine Besonderheit: Die Steuerung zur seitlichen Bewegung kann </a:t>
             </a:r>
@@ -5898,7 +6057,9 @@
                   <a:schemeClr val="bg1"/>
                 </a:solidFill>
                 <a:effectLst/>
-                <a:latin typeface="Consolas" panose="020B0609020204030204" pitchFamily="49" charset="0"/>
+                <a:latin typeface="Noto Sans" panose="020B0502040504020204" pitchFamily="34"/>
+                <a:ea typeface="Noto Sans" panose="020B0502040504020204" pitchFamily="34"/>
+                <a:cs typeface="Noto Sans" panose="020B0502040504020204" pitchFamily="34"/>
               </a:rPr>
               <a:t>normal</a:t>
             </a:r>
@@ -5908,7 +6069,9 @@
                   <a:schemeClr val="bg1"/>
                 </a:solidFill>
                 <a:effectLst/>
-                <a:latin typeface="Consolas" panose="020B0609020204030204" pitchFamily="49" charset="0"/>
+                <a:latin typeface="Noto Sans" panose="020B0502040504020204" pitchFamily="34"/>
+                <a:ea typeface="Noto Sans" panose="020B0502040504020204" pitchFamily="34"/>
+                <a:cs typeface="Noto Sans" panose="020B0502040504020204" pitchFamily="34"/>
               </a:rPr>
               <a:t> oder </a:t>
             </a:r>
@@ -5918,7 +6081,9 @@
                   <a:schemeClr val="bg1"/>
                 </a:solidFill>
                 <a:effectLst/>
-                <a:latin typeface="Consolas" panose="020B0609020204030204" pitchFamily="49" charset="0"/>
+                <a:latin typeface="Noto Sans" panose="020B0502040504020204" pitchFamily="34"/>
+                <a:ea typeface="Noto Sans" panose="020B0502040504020204" pitchFamily="34"/>
+                <a:cs typeface="Noto Sans" panose="020B0502040504020204" pitchFamily="34"/>
               </a:rPr>
               <a:t>invertiert</a:t>
             </a:r>
@@ -5928,7 +6093,9 @@
                   <a:schemeClr val="bg1"/>
                 </a:solidFill>
                 <a:effectLst/>
-                <a:latin typeface="Consolas" panose="020B0609020204030204" pitchFamily="49" charset="0"/>
+                <a:latin typeface="Noto Sans" panose="020B0502040504020204" pitchFamily="34"/>
+                <a:ea typeface="Noto Sans" panose="020B0502040504020204" pitchFamily="34"/>
+                <a:cs typeface="Noto Sans" panose="020B0502040504020204" pitchFamily="34"/>
               </a:rPr>
               <a:t> sein. </a:t>
             </a:r>
@@ -5939,7 +6106,9 @@
               <a:solidFill>
                 <a:schemeClr val="bg1"/>
               </a:solidFill>
-              <a:latin typeface="Consolas" panose="020B0609020204030204" pitchFamily="49" charset="0"/>
+              <a:latin typeface="Noto Sans" panose="020B0502040504020204" pitchFamily="34"/>
+              <a:ea typeface="Noto Sans" panose="020B0502040504020204" pitchFamily="34"/>
+              <a:cs typeface="Noto Sans" panose="020B0502040504020204" pitchFamily="34"/>
             </a:endParaRPr>
           </a:p>
           <a:p>
@@ -5948,7 +6117,9 @@
               <a:solidFill>
                 <a:schemeClr val="bg1"/>
               </a:solidFill>
-              <a:latin typeface="Consolas" panose="020B0609020204030204" pitchFamily="49" charset="0"/>
+              <a:latin typeface="Noto Sans" panose="020B0502040504020204" pitchFamily="34"/>
+              <a:ea typeface="Noto Sans" panose="020B0502040504020204" pitchFamily="34"/>
+              <a:cs typeface="Noto Sans" panose="020B0502040504020204" pitchFamily="34"/>
             </a:endParaRPr>
           </a:p>
           <a:p>
@@ -5958,7 +6129,9 @@
                 <a:solidFill>
                   <a:schemeClr val="bg1"/>
                 </a:solidFill>
-                <a:latin typeface="Consolas" panose="020B0609020204030204" pitchFamily="49" charset="0"/>
+                <a:latin typeface="Noto Sans" panose="020B0502040504020204" pitchFamily="34"/>
+                <a:ea typeface="Noto Sans" panose="020B0502040504020204" pitchFamily="34"/>
+                <a:cs typeface="Noto Sans" panose="020B0502040504020204" pitchFamily="34"/>
               </a:rPr>
               <a:t>Ob die Steuerung normal oder invertiert ist, unterliegt unterschiedlichen Wahrscheinlichkeiten.</a:t>
             </a:r>
@@ -5970,16 +6143,34 @@
                 <a:solidFill>
                   <a:schemeClr val="bg1"/>
                 </a:solidFill>
-                <a:latin typeface="Consolas" panose="020B0609020204030204" pitchFamily="49" charset="0"/>
-              </a:rPr>
-              <a:t>Diese Wahrscheinlichkeiten ändern sich während des Spiels nicht.</a:t>
+                <a:latin typeface="Noto Sans" panose="020B0502040504020204" pitchFamily="34"/>
+                <a:ea typeface="Noto Sans" panose="020B0502040504020204" pitchFamily="34"/>
+                <a:cs typeface="Noto Sans" panose="020B0502040504020204" pitchFamily="34"/>
+              </a:rPr>
+              <a:t>Diese Wahrscheinlichkeiten hängen von der Seite ab, auf der das Ziel erscheint.</a:t>
+            </a:r>
+          </a:p>
+          <a:p>
+            <a:pPr algn="ctr"/>
+            <a:r>
+              <a:rPr lang="de-DE" sz="2000" dirty="0">
+                <a:solidFill>
+                  <a:schemeClr val="bg1"/>
+                </a:solidFill>
+                <a:latin typeface="Noto Sans" panose="020B0502040504020204" pitchFamily="34"/>
+                <a:ea typeface="Noto Sans" panose="020B0502040504020204" pitchFamily="34"/>
+                <a:cs typeface="Noto Sans" panose="020B0502040504020204" pitchFamily="34"/>
+              </a:rPr>
+              <a:t>Sie ändern sich während eines Blockes nicht.</a:t>
             </a:r>
             <a:endParaRPr lang="de-DE" sz="2000" b="0" dirty="0">
               <a:solidFill>
                 <a:srgbClr val="CE9178"/>
               </a:solidFill>
               <a:effectLst/>
-              <a:latin typeface="Consolas" panose="020B0609020204030204" pitchFamily="49" charset="0"/>
+              <a:latin typeface="Noto Sans" panose="020B0502040504020204" pitchFamily="34"/>
+              <a:ea typeface="Noto Sans" panose="020B0502040504020204" pitchFamily="34"/>
+              <a:cs typeface="Noto Sans" panose="020B0502040504020204" pitchFamily="34"/>
             </a:endParaRPr>
           </a:p>
           <a:p>
@@ -5988,7 +6179,9 @@
                 <a:srgbClr val="CCCCCC"/>
               </a:solidFill>
               <a:effectLst/>
-              <a:latin typeface="Consolas" panose="020B0609020204030204" pitchFamily="49" charset="0"/>
+              <a:latin typeface="Noto Sans" panose="020B0502040504020204" pitchFamily="34"/>
+              <a:ea typeface="Noto Sans" panose="020B0502040504020204" pitchFamily="34"/>
+              <a:cs typeface="Noto Sans" panose="020B0502040504020204" pitchFamily="34"/>
             </a:endParaRPr>
           </a:p>
           <a:p>
@@ -5998,6 +6191,9 @@
                 <a:solidFill>
                   <a:schemeClr val="bg1"/>
                 </a:solidFill>
+                <a:latin typeface="Noto Sans" panose="020B0502040504020204" pitchFamily="34"/>
+                <a:ea typeface="Noto Sans" panose="020B0502040504020204" pitchFamily="34"/>
+                <a:cs typeface="Noto Sans" panose="020B0502040504020204" pitchFamily="34"/>
                 <a:sym typeface="Wingdings" panose="05000000000000000000" pitchFamily="2" charset="2"/>
               </a:rPr>
               <a:t>                  </a:t>
@@ -6006,6 +6202,9 @@
               <a:solidFill>
                 <a:schemeClr val="bg1"/>
               </a:solidFill>
+              <a:latin typeface="Noto Sans" panose="020B0502040504020204" pitchFamily="34"/>
+              <a:ea typeface="Noto Sans" panose="020B0502040504020204" pitchFamily="34"/>
+              <a:cs typeface="Noto Sans" panose="020B0502040504020204" pitchFamily="34"/>
               <a:sym typeface="Wingdings" panose="05000000000000000000" pitchFamily="2" charset="2"/>
             </a:endParaRPr>
           </a:p>
@@ -6016,6 +6215,9 @@
                 <a:solidFill>
                   <a:schemeClr val="bg1"/>
                 </a:solidFill>
+                <a:latin typeface="Noto Sans" panose="020B0502040504020204" pitchFamily="34"/>
+                <a:ea typeface="Noto Sans" panose="020B0502040504020204" pitchFamily="34"/>
+                <a:cs typeface="Noto Sans" panose="020B0502040504020204" pitchFamily="34"/>
                 <a:sym typeface="Wingdings" panose="05000000000000000000" pitchFamily="2" charset="2"/>
               </a:rPr>
               <a:t>Bitte die </a:t>
@@ -6025,6 +6227,9 @@
                 <a:solidFill>
                   <a:schemeClr val="bg1"/>
                 </a:solidFill>
+                <a:latin typeface="Noto Sans" panose="020B0502040504020204" pitchFamily="34"/>
+                <a:ea typeface="Noto Sans" panose="020B0502040504020204" pitchFamily="34"/>
+                <a:cs typeface="Noto Sans" panose="020B0502040504020204" pitchFamily="34"/>
                 <a:sym typeface="Wingdings" panose="05000000000000000000" pitchFamily="2" charset="2"/>
               </a:rPr>
               <a:t>LEERTASTE</a:t>
@@ -6034,6 +6239,9 @@
                 <a:solidFill>
                   <a:schemeClr val="bg1"/>
                 </a:solidFill>
+                <a:latin typeface="Noto Sans" panose="020B0502040504020204" pitchFamily="34"/>
+                <a:ea typeface="Noto Sans" panose="020B0502040504020204" pitchFamily="34"/>
+                <a:cs typeface="Noto Sans" panose="020B0502040504020204" pitchFamily="34"/>
                 <a:sym typeface="Wingdings" panose="05000000000000000000" pitchFamily="2" charset="2"/>
               </a:rPr>
               <a:t> drücken, um fortzufahren</a:t>
@@ -6042,6 +6250,9 @@
               <a:solidFill>
                 <a:schemeClr val="bg1"/>
               </a:solidFill>
+              <a:latin typeface="Noto Sans" panose="020B0502040504020204" pitchFamily="34"/>
+              <a:ea typeface="Noto Sans" panose="020B0502040504020204" pitchFamily="34"/>
+              <a:cs typeface="Noto Sans" panose="020B0502040504020204" pitchFamily="34"/>
             </a:endParaRPr>
           </a:p>
         </p:txBody>
@@ -6123,7 +6334,9 @@
               <a:solidFill>
                 <a:schemeClr val="bg1"/>
               </a:solidFill>
-              <a:latin typeface="Consolas" panose="020B0609020204030204" pitchFamily="49" charset="0"/>
+              <a:latin typeface="Noto Sans" panose="020B0502040504020204" pitchFamily="34"/>
+              <a:ea typeface="Noto Sans" panose="020B0502040504020204" pitchFamily="34"/>
+              <a:cs typeface="Noto Sans" panose="020B0502040504020204" pitchFamily="34"/>
             </a:endParaRPr>
           </a:p>
           <a:p>
@@ -6132,7 +6345,9 @@
               <a:solidFill>
                 <a:schemeClr val="bg1"/>
               </a:solidFill>
-              <a:latin typeface="Consolas" panose="020B0609020204030204" pitchFamily="49" charset="0"/>
+              <a:latin typeface="Noto Sans" panose="020B0502040504020204" pitchFamily="34"/>
+              <a:ea typeface="Noto Sans" panose="020B0502040504020204" pitchFamily="34"/>
+              <a:cs typeface="Noto Sans" panose="020B0502040504020204" pitchFamily="34"/>
             </a:endParaRPr>
           </a:p>
           <a:p>
@@ -6141,7 +6356,9 @@
               <a:solidFill>
                 <a:schemeClr val="bg1"/>
               </a:solidFill>
-              <a:latin typeface="Consolas" panose="020B0609020204030204" pitchFamily="49" charset="0"/>
+              <a:latin typeface="Noto Sans" panose="020B0502040504020204" pitchFamily="34"/>
+              <a:ea typeface="Noto Sans" panose="020B0502040504020204" pitchFamily="34"/>
+              <a:cs typeface="Noto Sans" panose="020B0502040504020204" pitchFamily="34"/>
             </a:endParaRPr>
           </a:p>
           <a:p>
@@ -6150,7 +6367,9 @@
               <a:solidFill>
                 <a:schemeClr val="bg1"/>
               </a:solidFill>
-              <a:latin typeface="Consolas" panose="020B0609020204030204" pitchFamily="49" charset="0"/>
+              <a:latin typeface="Noto Sans" panose="020B0502040504020204" pitchFamily="34"/>
+              <a:ea typeface="Noto Sans" panose="020B0502040504020204" pitchFamily="34"/>
+              <a:cs typeface="Noto Sans" panose="020B0502040504020204" pitchFamily="34"/>
             </a:endParaRPr>
           </a:p>
           <a:p>
@@ -6159,7 +6378,9 @@
               <a:solidFill>
                 <a:schemeClr val="bg1"/>
               </a:solidFill>
-              <a:latin typeface="Consolas" panose="020B0609020204030204" pitchFamily="49" charset="0"/>
+              <a:latin typeface="Noto Sans" panose="020B0502040504020204" pitchFamily="34"/>
+              <a:ea typeface="Noto Sans" panose="020B0502040504020204" pitchFamily="34"/>
+              <a:cs typeface="Noto Sans" panose="020B0502040504020204" pitchFamily="34"/>
             </a:endParaRPr>
           </a:p>
           <a:p>
@@ -6169,7 +6390,9 @@
                 <a:solidFill>
                   <a:schemeClr val="bg1"/>
                 </a:solidFill>
-                <a:latin typeface="Consolas" panose="020B0609020204030204" pitchFamily="49" charset="0"/>
+                <a:latin typeface="Noto Sans" panose="020B0502040504020204" pitchFamily="34"/>
+                <a:ea typeface="Noto Sans" panose="020B0502040504020204" pitchFamily="34"/>
+                <a:cs typeface="Noto Sans" panose="020B0502040504020204" pitchFamily="34"/>
               </a:rPr>
               <a:t>Es kann passieren, dass das Ziel nicht erscheint. Das ist ein Fehler des Spiels. Lassen Sie sich nicht verunsichern und warten Sie, nach wenigen Sekunden startet automatisch der nächste Durchlauf.</a:t>
             </a:r>
@@ -6178,7 +6401,9 @@
                 <a:schemeClr val="bg1"/>
               </a:solidFill>
               <a:effectLst/>
-              <a:latin typeface="Consolas" panose="020B0609020204030204" pitchFamily="49" charset="0"/>
+              <a:latin typeface="Noto Sans" panose="020B0502040504020204" pitchFamily="34"/>
+              <a:ea typeface="Noto Sans" panose="020B0502040504020204" pitchFamily="34"/>
+              <a:cs typeface="Noto Sans" panose="020B0502040504020204" pitchFamily="34"/>
             </a:endParaRPr>
           </a:p>
           <a:p>
@@ -6187,7 +6412,9 @@
               <a:solidFill>
                 <a:schemeClr val="bg1"/>
               </a:solidFill>
-              <a:latin typeface="Consolas" panose="020B0609020204030204" pitchFamily="49" charset="0"/>
+              <a:latin typeface="Noto Sans" panose="020B0502040504020204" pitchFamily="34"/>
+              <a:ea typeface="Noto Sans" panose="020B0502040504020204" pitchFamily="34"/>
+              <a:cs typeface="Noto Sans" panose="020B0502040504020204" pitchFamily="34"/>
             </a:endParaRPr>
           </a:p>
           <a:p>
@@ -6197,7 +6424,9 @@
                 <a:schemeClr val="bg1"/>
               </a:solidFill>
               <a:effectLst/>
-              <a:latin typeface="Consolas" panose="020B0609020204030204" pitchFamily="49" charset="0"/>
+              <a:latin typeface="Noto Sans" panose="020B0502040504020204" pitchFamily="34"/>
+              <a:ea typeface="Noto Sans" panose="020B0502040504020204" pitchFamily="34"/>
+              <a:cs typeface="Noto Sans" panose="020B0502040504020204" pitchFamily="34"/>
             </a:endParaRPr>
           </a:p>
           <a:p>
@@ -6206,7 +6435,9 @@
               <a:solidFill>
                 <a:schemeClr val="bg1"/>
               </a:solidFill>
-              <a:latin typeface="Consolas" panose="020B0609020204030204" pitchFamily="49" charset="0"/>
+              <a:latin typeface="Noto Sans" panose="020B0502040504020204" pitchFamily="34"/>
+              <a:ea typeface="Noto Sans" panose="020B0502040504020204" pitchFamily="34"/>
+              <a:cs typeface="Noto Sans" panose="020B0502040504020204" pitchFamily="34"/>
             </a:endParaRPr>
           </a:p>
           <a:p>
@@ -6215,6 +6446,9 @@
               <a:solidFill>
                 <a:schemeClr val="bg1"/>
               </a:solidFill>
+              <a:latin typeface="Noto Sans" panose="020B0502040504020204" pitchFamily="34"/>
+              <a:ea typeface="Noto Sans" panose="020B0502040504020204" pitchFamily="34"/>
+              <a:cs typeface="Noto Sans" panose="020B0502040504020204" pitchFamily="34"/>
               <a:sym typeface="Wingdings" panose="05000000000000000000" pitchFamily="2" charset="2"/>
             </a:endParaRPr>
           </a:p>
@@ -6224,6 +6458,9 @@
               <a:solidFill>
                 <a:schemeClr val="bg1"/>
               </a:solidFill>
+              <a:latin typeface="Noto Sans" panose="020B0502040504020204" pitchFamily="34"/>
+              <a:ea typeface="Noto Sans" panose="020B0502040504020204" pitchFamily="34"/>
+              <a:cs typeface="Noto Sans" panose="020B0502040504020204" pitchFamily="34"/>
               <a:sym typeface="Wingdings" panose="05000000000000000000" pitchFamily="2" charset="2"/>
             </a:endParaRPr>
           </a:p>
@@ -6234,6 +6471,9 @@
                 <a:solidFill>
                   <a:schemeClr val="bg1"/>
                 </a:solidFill>
+                <a:latin typeface="Noto Sans" panose="020B0502040504020204" pitchFamily="34"/>
+                <a:ea typeface="Noto Sans" panose="020B0502040504020204" pitchFamily="34"/>
+                <a:cs typeface="Noto Sans" panose="020B0502040504020204" pitchFamily="34"/>
                 <a:sym typeface="Wingdings" panose="05000000000000000000" pitchFamily="2" charset="2"/>
               </a:rPr>
               <a:t>Bitte die </a:t>
@@ -6243,6 +6483,9 @@
                 <a:solidFill>
                   <a:schemeClr val="bg1"/>
                 </a:solidFill>
+                <a:latin typeface="Noto Sans" panose="020B0502040504020204" pitchFamily="34"/>
+                <a:ea typeface="Noto Sans" panose="020B0502040504020204" pitchFamily="34"/>
+                <a:cs typeface="Noto Sans" panose="020B0502040504020204" pitchFamily="34"/>
                 <a:sym typeface="Wingdings" panose="05000000000000000000" pitchFamily="2" charset="2"/>
               </a:rPr>
               <a:t>LEERTASTE</a:t>
@@ -6252,6 +6495,9 @@
                 <a:solidFill>
                   <a:schemeClr val="bg1"/>
                 </a:solidFill>
+                <a:latin typeface="Noto Sans" panose="020B0502040504020204" pitchFamily="34"/>
+                <a:ea typeface="Noto Sans" panose="020B0502040504020204" pitchFamily="34"/>
+                <a:cs typeface="Noto Sans" panose="020B0502040504020204" pitchFamily="34"/>
                 <a:sym typeface="Wingdings" panose="05000000000000000000" pitchFamily="2" charset="2"/>
               </a:rPr>
               <a:t> drücken, um fortzufahren</a:t>
@@ -6260,6 +6506,9 @@
               <a:solidFill>
                 <a:schemeClr val="bg1"/>
               </a:solidFill>
+              <a:latin typeface="Noto Sans" panose="020B0502040504020204" pitchFamily="34"/>
+              <a:ea typeface="Noto Sans" panose="020B0502040504020204" pitchFamily="34"/>
+              <a:cs typeface="Noto Sans" panose="020B0502040504020204" pitchFamily="34"/>
             </a:endParaRPr>
           </a:p>
         </p:txBody>
@@ -6651,7 +6900,9 @@
                   <a:schemeClr val="bg1"/>
                 </a:solidFill>
                 <a:effectLst/>
-                <a:latin typeface="Consolas" panose="020B0609020204030204" pitchFamily="49" charset="0"/>
+                <a:latin typeface="Noto Sans" panose="020B0502040504020204" pitchFamily="34"/>
+                <a:ea typeface="Noto Sans" panose="020B0502040504020204" pitchFamily="34"/>
+                <a:cs typeface="Noto Sans" panose="020B0502040504020204" pitchFamily="34"/>
               </a:rPr>
               <a:t>Herzlich willkommen und vielen Dank für die Teilnahme am Experiment</a:t>
             </a:r>
@@ -6690,6 +6941,9 @@
                 <a:solidFill>
                   <a:schemeClr val="bg1"/>
                 </a:solidFill>
+                <a:latin typeface="Noto Sans" panose="020B0502040504020204" pitchFamily="34"/>
+                <a:ea typeface="Noto Sans" panose="020B0502040504020204" pitchFamily="34"/>
+                <a:cs typeface="Noto Sans" panose="020B0502040504020204" pitchFamily="34"/>
                 <a:sym typeface="Wingdings" panose="05000000000000000000" pitchFamily="2" charset="2"/>
               </a:rPr>
               <a:t>Bitte die </a:t>
@@ -6699,6 +6953,9 @@
                 <a:solidFill>
                   <a:schemeClr val="bg1"/>
                 </a:solidFill>
+                <a:latin typeface="Noto Sans" panose="020B0502040504020204" pitchFamily="34"/>
+                <a:ea typeface="Noto Sans" panose="020B0502040504020204" pitchFamily="34"/>
+                <a:cs typeface="Noto Sans" panose="020B0502040504020204" pitchFamily="34"/>
                 <a:sym typeface="Wingdings" panose="05000000000000000000" pitchFamily="2" charset="2"/>
               </a:rPr>
               <a:t>LEERTASTE</a:t>
@@ -6708,6 +6965,9 @@
                 <a:solidFill>
                   <a:schemeClr val="bg1"/>
                 </a:solidFill>
+                <a:latin typeface="Noto Sans" panose="020B0502040504020204" pitchFamily="34"/>
+                <a:ea typeface="Noto Sans" panose="020B0502040504020204" pitchFamily="34"/>
+                <a:cs typeface="Noto Sans" panose="020B0502040504020204" pitchFamily="34"/>
                 <a:sym typeface="Wingdings" panose="05000000000000000000" pitchFamily="2" charset="2"/>
               </a:rPr>
               <a:t> drücken, um fortzufahren</a:t>
@@ -6716,6 +6976,9 @@
               <a:solidFill>
                 <a:schemeClr val="bg1"/>
               </a:solidFill>
+              <a:latin typeface="Noto Sans" panose="020B0502040504020204" pitchFamily="34"/>
+              <a:ea typeface="Noto Sans" panose="020B0502040504020204" pitchFamily="34"/>
+              <a:cs typeface="Noto Sans" panose="020B0502040504020204" pitchFamily="34"/>
             </a:endParaRPr>
           </a:p>
         </p:txBody>
@@ -11431,7 +11694,9 @@
                   <a:schemeClr val="bg1"/>
                 </a:solidFill>
                 <a:effectLst/>
-                <a:latin typeface="Consolas" panose="020B0609020204030204" pitchFamily="49" charset="0"/>
+                <a:latin typeface="Noto Sans" panose="020B0502040504020204" pitchFamily="34"/>
+                <a:ea typeface="Noto Sans" panose="020B0502040504020204" pitchFamily="34"/>
+                <a:cs typeface="Noto Sans" panose="020B0502040504020204" pitchFamily="34"/>
               </a:rPr>
               <a:t>Sie spielen heute ein Computerspiel in mehreren Blöcken.</a:t>
             </a:r>
@@ -11470,6 +11735,9 @@
                 <a:solidFill>
                   <a:schemeClr val="bg1"/>
                 </a:solidFill>
+                <a:latin typeface="Noto Sans" panose="020B0502040504020204" pitchFamily="34"/>
+                <a:ea typeface="Noto Sans" panose="020B0502040504020204" pitchFamily="34"/>
+                <a:cs typeface="Noto Sans" panose="020B0502040504020204" pitchFamily="34"/>
                 <a:sym typeface="Wingdings" panose="05000000000000000000" pitchFamily="2" charset="2"/>
               </a:rPr>
               <a:t>Bitte die </a:t>
@@ -11479,6 +11747,9 @@
                 <a:solidFill>
                   <a:schemeClr val="bg1"/>
                 </a:solidFill>
+                <a:latin typeface="Noto Sans" panose="020B0502040504020204" pitchFamily="34"/>
+                <a:ea typeface="Noto Sans" panose="020B0502040504020204" pitchFamily="34"/>
+                <a:cs typeface="Noto Sans" panose="020B0502040504020204" pitchFamily="34"/>
                 <a:sym typeface="Wingdings" panose="05000000000000000000" pitchFamily="2" charset="2"/>
               </a:rPr>
               <a:t>LEERTASTE</a:t>
@@ -11488,6 +11759,9 @@
                 <a:solidFill>
                   <a:schemeClr val="bg1"/>
                 </a:solidFill>
+                <a:latin typeface="Noto Sans" panose="020B0502040504020204" pitchFamily="34"/>
+                <a:ea typeface="Noto Sans" panose="020B0502040504020204" pitchFamily="34"/>
+                <a:cs typeface="Noto Sans" panose="020B0502040504020204" pitchFamily="34"/>
                 <a:sym typeface="Wingdings" panose="05000000000000000000" pitchFamily="2" charset="2"/>
               </a:rPr>
               <a:t> drücken, um fortzufahren</a:t>
@@ -11496,6 +11770,9 @@
               <a:solidFill>
                 <a:schemeClr val="bg1"/>
               </a:solidFill>
+              <a:latin typeface="Noto Sans" panose="020B0502040504020204" pitchFamily="34"/>
+              <a:ea typeface="Noto Sans" panose="020B0502040504020204" pitchFamily="34"/>
+              <a:cs typeface="Noto Sans" panose="020B0502040504020204" pitchFamily="34"/>
             </a:endParaRPr>
           </a:p>
         </p:txBody>
@@ -12067,7 +12344,9 @@
                   <a:schemeClr val="bg1"/>
                 </a:solidFill>
                 <a:effectLst/>
-                <a:latin typeface="Consolas" panose="020B0609020204030204" pitchFamily="49" charset="0"/>
+                <a:latin typeface="Noto Sans" panose="020B0502040504020204" pitchFamily="34"/>
+                <a:ea typeface="Noto Sans" panose="020B0502040504020204" pitchFamily="34"/>
+                <a:cs typeface="Noto Sans" panose="020B0502040504020204" pitchFamily="34"/>
               </a:rPr>
               <a:t>Beginnen wir mit den Instruktionen!</a:t>
             </a:r>
@@ -12096,6 +12375,9 @@
               <a:solidFill>
                 <a:schemeClr val="bg1"/>
               </a:solidFill>
+              <a:latin typeface="Noto Sans" panose="020B0502040504020204" pitchFamily="34"/>
+              <a:ea typeface="Noto Sans" panose="020B0502040504020204" pitchFamily="34"/>
+              <a:cs typeface="Noto Sans" panose="020B0502040504020204" pitchFamily="34"/>
               <a:sym typeface="Wingdings" panose="05000000000000000000" pitchFamily="2" charset="2"/>
             </a:endParaRPr>
           </a:p>
@@ -12106,6 +12388,9 @@
                 <a:solidFill>
                   <a:schemeClr val="bg1"/>
                 </a:solidFill>
+                <a:latin typeface="Noto Sans" panose="020B0502040504020204" pitchFamily="34"/>
+                <a:ea typeface="Noto Sans" panose="020B0502040504020204" pitchFamily="34"/>
+                <a:cs typeface="Noto Sans" panose="020B0502040504020204" pitchFamily="34"/>
                 <a:sym typeface="Wingdings" panose="05000000000000000000" pitchFamily="2" charset="2"/>
               </a:rPr>
               <a:t>Bitte die </a:t>
@@ -12115,6 +12400,9 @@
                 <a:solidFill>
                   <a:schemeClr val="bg1"/>
                 </a:solidFill>
+                <a:latin typeface="Noto Sans" panose="020B0502040504020204" pitchFamily="34"/>
+                <a:ea typeface="Noto Sans" panose="020B0502040504020204" pitchFamily="34"/>
+                <a:cs typeface="Noto Sans" panose="020B0502040504020204" pitchFamily="34"/>
                 <a:sym typeface="Wingdings" panose="05000000000000000000" pitchFamily="2" charset="2"/>
               </a:rPr>
               <a:t>LEERTASTE</a:t>
@@ -12124,6 +12412,9 @@
                 <a:solidFill>
                   <a:schemeClr val="bg1"/>
                 </a:solidFill>
+                <a:latin typeface="Noto Sans" panose="020B0502040504020204" pitchFamily="34"/>
+                <a:ea typeface="Noto Sans" panose="020B0502040504020204" pitchFamily="34"/>
+                <a:cs typeface="Noto Sans" panose="020B0502040504020204" pitchFamily="34"/>
                 <a:sym typeface="Wingdings" panose="05000000000000000000" pitchFamily="2" charset="2"/>
               </a:rPr>
               <a:t> drücken, um fortzufahren</a:t>
@@ -12132,6 +12423,9 @@
               <a:solidFill>
                 <a:schemeClr val="bg1"/>
               </a:solidFill>
+              <a:latin typeface="Noto Sans" panose="020B0502040504020204" pitchFamily="34"/>
+              <a:ea typeface="Noto Sans" panose="020B0502040504020204" pitchFamily="34"/>
+              <a:cs typeface="Noto Sans" panose="020B0502040504020204" pitchFamily="34"/>
             </a:endParaRPr>
           </a:p>
         </p:txBody>
@@ -12245,7 +12539,9 @@
                   <a:schemeClr val="bg1"/>
                 </a:solidFill>
                 <a:effectLst/>
-                <a:latin typeface="Consolas" panose="020B0609020204030204" pitchFamily="49" charset="0"/>
+                <a:latin typeface="Noto Sans" panose="020B0502040504020204" pitchFamily="34"/>
+                <a:ea typeface="Noto Sans" panose="020B0502040504020204" pitchFamily="34"/>
+                <a:cs typeface="Noto Sans" panose="020B0502040504020204" pitchFamily="34"/>
               </a:rPr>
               <a:t>Ihre Aufgabe ist es, </a:t>
             </a:r>
@@ -12255,7 +12551,9 @@
                   <a:schemeClr val="bg1"/>
                 </a:solidFill>
                 <a:effectLst/>
-                <a:latin typeface="Consolas" panose="020B0609020204030204" pitchFamily="49" charset="0"/>
+                <a:latin typeface="Noto Sans" panose="020B0502040504020204" pitchFamily="34"/>
+                <a:ea typeface="Noto Sans" panose="020B0502040504020204" pitchFamily="34"/>
+                <a:cs typeface="Noto Sans" panose="020B0502040504020204" pitchFamily="34"/>
               </a:rPr>
               <a:t>nach links oder rechts zu steuern, um auf das an einer zufälligen Stelle erscheinende</a:t>
             </a:r>
@@ -12265,7 +12563,9 @@
                   <a:srgbClr val="FFFF00"/>
                 </a:solidFill>
                 <a:effectLst/>
-                <a:latin typeface="Consolas" panose="020B0609020204030204" pitchFamily="49" charset="0"/>
+                <a:latin typeface="Noto Sans" panose="020B0502040504020204" pitchFamily="34"/>
+                <a:ea typeface="Noto Sans" panose="020B0502040504020204" pitchFamily="34"/>
+                <a:cs typeface="Noto Sans" panose="020B0502040504020204" pitchFamily="34"/>
               </a:rPr>
               <a:t> Ziel </a:t>
             </a:r>
@@ -12275,7 +12575,9 @@
                   <a:schemeClr val="bg1"/>
                 </a:solidFill>
                 <a:effectLst/>
-                <a:latin typeface="Consolas" panose="020B0609020204030204" pitchFamily="49" charset="0"/>
+                <a:latin typeface="Noto Sans" panose="020B0502040504020204" pitchFamily="34"/>
+                <a:ea typeface="Noto Sans" panose="020B0502040504020204" pitchFamily="34"/>
+                <a:cs typeface="Noto Sans" panose="020B0502040504020204" pitchFamily="34"/>
               </a:rPr>
               <a:t>zu schießen.</a:t>
             </a:r>
@@ -12371,6 +12673,9 @@
                 <a:solidFill>
                   <a:schemeClr val="bg1"/>
                 </a:solidFill>
+                <a:latin typeface="Noto Sans" panose="020B0502040504020204" pitchFamily="34"/>
+                <a:ea typeface="Noto Sans" panose="020B0502040504020204" pitchFamily="34"/>
+                <a:cs typeface="Noto Sans" panose="020B0502040504020204" pitchFamily="34"/>
                 <a:sym typeface="Wingdings" panose="05000000000000000000" pitchFamily="2" charset="2"/>
               </a:rPr>
               <a:t>Bitte die </a:t>
@@ -12380,6 +12685,9 @@
                 <a:solidFill>
                   <a:schemeClr val="bg1"/>
                 </a:solidFill>
+                <a:latin typeface="Noto Sans" panose="020B0502040504020204" pitchFamily="34"/>
+                <a:ea typeface="Noto Sans" panose="020B0502040504020204" pitchFamily="34"/>
+                <a:cs typeface="Noto Sans" panose="020B0502040504020204" pitchFamily="34"/>
                 <a:sym typeface="Wingdings" panose="05000000000000000000" pitchFamily="2" charset="2"/>
               </a:rPr>
               <a:t>LEERTASTE</a:t>
@@ -12389,6 +12697,9 @@
                 <a:solidFill>
                   <a:schemeClr val="bg1"/>
                 </a:solidFill>
+                <a:latin typeface="Noto Sans" panose="020B0502040504020204" pitchFamily="34"/>
+                <a:ea typeface="Noto Sans" panose="020B0502040504020204" pitchFamily="34"/>
+                <a:cs typeface="Noto Sans" panose="020B0502040504020204" pitchFamily="34"/>
                 <a:sym typeface="Wingdings" panose="05000000000000000000" pitchFamily="2" charset="2"/>
               </a:rPr>
               <a:t> drücken, um fortzufahren</a:t>
@@ -12397,6 +12708,9 @@
               <a:solidFill>
                 <a:schemeClr val="bg1"/>
               </a:solidFill>
+              <a:latin typeface="Noto Sans" panose="020B0502040504020204" pitchFamily="34"/>
+              <a:ea typeface="Noto Sans" panose="020B0502040504020204" pitchFamily="34"/>
+              <a:cs typeface="Noto Sans" panose="020B0502040504020204" pitchFamily="34"/>
             </a:endParaRPr>
           </a:p>
         </p:txBody>

</xml_diff>

<commit_message>
changed instructions about reward, spelling
</commit_message>
<xml_diff>
--- a/exp_img/instructions.pptx
+++ b/exp_img/instructions.pptx
@@ -291,7 +291,7 @@
           <a:p>
             <a:fld id="{9583AF26-4D68-42D5-A917-CD55DA578274}" type="datetimeFigureOut">
               <a:rPr lang="de-DE" smtClean="0"/>
-              <a:t>17.03.2025</a:t>
+              <a:t>19.03.2025</a:t>
             </a:fld>
             <a:endParaRPr lang="de-DE"/>
           </a:p>
@@ -489,7 +489,7 @@
           <a:p>
             <a:fld id="{9583AF26-4D68-42D5-A917-CD55DA578274}" type="datetimeFigureOut">
               <a:rPr lang="de-DE" smtClean="0"/>
-              <a:t>17.03.2025</a:t>
+              <a:t>19.03.2025</a:t>
             </a:fld>
             <a:endParaRPr lang="de-DE"/>
           </a:p>
@@ -697,7 +697,7 @@
           <a:p>
             <a:fld id="{9583AF26-4D68-42D5-A917-CD55DA578274}" type="datetimeFigureOut">
               <a:rPr lang="de-DE" smtClean="0"/>
-              <a:t>17.03.2025</a:t>
+              <a:t>19.03.2025</a:t>
             </a:fld>
             <a:endParaRPr lang="de-DE"/>
           </a:p>
@@ -895,7 +895,7 @@
           <a:p>
             <a:fld id="{9583AF26-4D68-42D5-A917-CD55DA578274}" type="datetimeFigureOut">
               <a:rPr lang="de-DE" smtClean="0"/>
-              <a:t>17.03.2025</a:t>
+              <a:t>19.03.2025</a:t>
             </a:fld>
             <a:endParaRPr lang="de-DE"/>
           </a:p>
@@ -1170,7 +1170,7 @@
           <a:p>
             <a:fld id="{9583AF26-4D68-42D5-A917-CD55DA578274}" type="datetimeFigureOut">
               <a:rPr lang="de-DE" smtClean="0"/>
-              <a:t>17.03.2025</a:t>
+              <a:t>19.03.2025</a:t>
             </a:fld>
             <a:endParaRPr lang="de-DE"/>
           </a:p>
@@ -1435,7 +1435,7 @@
           <a:p>
             <a:fld id="{9583AF26-4D68-42D5-A917-CD55DA578274}" type="datetimeFigureOut">
               <a:rPr lang="de-DE" smtClean="0"/>
-              <a:t>17.03.2025</a:t>
+              <a:t>19.03.2025</a:t>
             </a:fld>
             <a:endParaRPr lang="de-DE"/>
           </a:p>
@@ -1847,7 +1847,7 @@
           <a:p>
             <a:fld id="{9583AF26-4D68-42D5-A917-CD55DA578274}" type="datetimeFigureOut">
               <a:rPr lang="de-DE" smtClean="0"/>
-              <a:t>17.03.2025</a:t>
+              <a:t>19.03.2025</a:t>
             </a:fld>
             <a:endParaRPr lang="de-DE"/>
           </a:p>
@@ -1988,7 +1988,7 @@
           <a:p>
             <a:fld id="{9583AF26-4D68-42D5-A917-CD55DA578274}" type="datetimeFigureOut">
               <a:rPr lang="de-DE" smtClean="0"/>
-              <a:t>17.03.2025</a:t>
+              <a:t>19.03.2025</a:t>
             </a:fld>
             <a:endParaRPr lang="de-DE"/>
           </a:p>
@@ -2101,7 +2101,7 @@
           <a:p>
             <a:fld id="{9583AF26-4D68-42D5-A917-CD55DA578274}" type="datetimeFigureOut">
               <a:rPr lang="de-DE" smtClean="0"/>
-              <a:t>17.03.2025</a:t>
+              <a:t>19.03.2025</a:t>
             </a:fld>
             <a:endParaRPr lang="de-DE"/>
           </a:p>
@@ -2412,7 +2412,7 @@
           <a:p>
             <a:fld id="{9583AF26-4D68-42D5-A917-CD55DA578274}" type="datetimeFigureOut">
               <a:rPr lang="de-DE" smtClean="0"/>
-              <a:t>17.03.2025</a:t>
+              <a:t>19.03.2025</a:t>
             </a:fld>
             <a:endParaRPr lang="de-DE"/>
           </a:p>
@@ -2700,7 +2700,7 @@
           <a:p>
             <a:fld id="{9583AF26-4D68-42D5-A917-CD55DA578274}" type="datetimeFigureOut">
               <a:rPr lang="de-DE" smtClean="0"/>
-              <a:t>17.03.2025</a:t>
+              <a:t>19.03.2025</a:t>
             </a:fld>
             <a:endParaRPr lang="de-DE"/>
           </a:p>
@@ -2941,7 +2941,7 @@
           <a:p>
             <a:fld id="{9583AF26-4D68-42D5-A917-CD55DA578274}" type="datetimeFigureOut">
               <a:rPr lang="de-DE" smtClean="0"/>
-              <a:t>17.03.2025</a:t>
+              <a:t>19.03.2025</a:t>
             </a:fld>
             <a:endParaRPr lang="de-DE"/>
           </a:p>
@@ -4429,7 +4429,7 @@
                 <a:cs typeface="Noto Sans" panose="020B0502040504020204" pitchFamily="34"/>
                 <a:sym typeface="Wingdings" panose="05000000000000000000" pitchFamily="2" charset="2"/>
               </a:rPr>
-              <a:t>Jeder Spieldurchlauf besteht aus Start, Erscheinen des Ziels, Bewegung zum und schießen auf das Ziel und der Punkteanzeige:</a:t>
+              <a:t>Jeder Spieldurchlauf besteht aus Start, Erscheinen des Ziels, Bewegung zum und Schießen auf das Ziel und der Punkteanzeige:</a:t>
             </a:r>
           </a:p>
           <a:p>
@@ -4935,7 +4935,7 @@
         <p:spPr>
           <a:xfrm>
             <a:off x="1574008" y="327932"/>
-            <a:ext cx="8143960" cy="5724644"/>
+            <a:ext cx="8143960" cy="6309420"/>
           </a:xfrm>
           <a:prstGeom prst="rect">
             <a:avLst/>
@@ -4959,7 +4959,7 @@
                 <a:cs typeface="Noto Sans" panose="020B0502040504020204" pitchFamily="34"/>
                 <a:sym typeface="Wingdings" panose="05000000000000000000" pitchFamily="2" charset="2"/>
               </a:rPr>
-              <a:t>Nun steuern Sie mit den Tasten A und D Ihre Spielfigur seitlich auf Höhe des Ziels und schießen mit STRG darauf. </a:t>
+              <a:t>Nun steuern Sie mit den Tasten A und D Ihre Spielfigur seitlich auf Höhe des Ziels und schießen mit STRG darauf. Sollten Sie sich über das Ziel hinaus bewegen, können Sie ihre Bewegung korrigieren </a:t>
             </a:r>
           </a:p>
           <a:p>
@@ -5082,18 +5082,6 @@
                 <a:schemeClr val="bg1"/>
               </a:solidFill>
               <a:latin typeface="Consolas" panose="020B0609020204030204" pitchFamily="49" charset="0"/>
-              <a:sym typeface="Wingdings" panose="05000000000000000000" pitchFamily="2" charset="2"/>
-            </a:endParaRPr>
-          </a:p>
-          <a:p>
-            <a:pPr algn="ctr"/>
-            <a:endParaRPr lang="de-DE" dirty="0">
-              <a:solidFill>
-                <a:schemeClr val="bg1"/>
-              </a:solidFill>
-              <a:latin typeface="Noto Sans" panose="020B0502040504020204" pitchFamily="34"/>
-              <a:ea typeface="Noto Sans" panose="020B0502040504020204" pitchFamily="34"/>
-              <a:cs typeface="Noto Sans" panose="020B0502040504020204" pitchFamily="34"/>
               <a:sym typeface="Wingdings" panose="05000000000000000000" pitchFamily="2" charset="2"/>
             </a:endParaRPr>
           </a:p>
@@ -5174,7 +5162,7 @@
         </p:blipFill>
         <p:spPr>
           <a:xfrm>
-            <a:off x="3087832" y="2796349"/>
+            <a:off x="3087833" y="3331186"/>
             <a:ext cx="4706058" cy="2646084"/>
           </a:xfrm>
           <a:prstGeom prst="rect">
@@ -5241,7 +5229,7 @@
         <p:spPr>
           <a:xfrm>
             <a:off x="1574008" y="327932"/>
-            <a:ext cx="8143960" cy="6217087"/>
+            <a:ext cx="8143960" cy="6247864"/>
           </a:xfrm>
           <a:prstGeom prst="rect">
             <a:avLst/>
@@ -5263,7 +5251,7 @@
                 <a:latin typeface="Consolas" panose="020B0609020204030204" pitchFamily="49" charset="0"/>
                 <a:sym typeface="Wingdings" panose="05000000000000000000" pitchFamily="2" charset="2"/>
               </a:rPr>
-              <a:t>Sobald das Ziel getroffen oder die maximale Zeit überschritten wird, endet der Spieldurchlauf. Anschließend werden die erreichten Punkte (abhängig von benötigter Zeit und Treffen des Ziels) für 1 Sekunde angezeigt. </a:t>
+              <a:t>Sobald das Ziel getroffen oder die maximale Zeit überschritten wird, endet der Spieldurchlauf. Für einen Treffer gibt es 1 Punkt, ansonsten 0. Anschließend werden die erreichten Punkte für den aktuellen Durchlauf und die Gesamtpunktzahl für den Block für 1 Sekunde angezeigt. </a:t>
             </a:r>
             <a:r>
               <a:rPr lang="de-DE" sz="2000" u="sng" dirty="0">
@@ -5363,15 +5351,6 @@
                 <a:schemeClr val="bg1"/>
               </a:solidFill>
               <a:latin typeface="Consolas" panose="020B0609020204030204" pitchFamily="49" charset="0"/>
-              <a:sym typeface="Wingdings" panose="05000000000000000000" pitchFamily="2" charset="2"/>
-            </a:endParaRPr>
-          </a:p>
-          <a:p>
-            <a:pPr algn="ctr"/>
-            <a:endParaRPr lang="de-DE" dirty="0">
-              <a:solidFill>
-                <a:schemeClr val="bg1"/>
-              </a:solidFill>
               <a:sym typeface="Wingdings" panose="05000000000000000000" pitchFamily="2" charset="2"/>
             </a:endParaRPr>
           </a:p>
@@ -5440,7 +5419,7 @@
         </p:blipFill>
         <p:spPr>
           <a:xfrm>
-            <a:off x="2915727" y="2713222"/>
+            <a:off x="2846715" y="2954762"/>
             <a:ext cx="5460521" cy="3070298"/>
           </a:xfrm>
           <a:prstGeom prst="rect">

</xml_diff>